<commit_message>
Fix problems with total resolved in collatz-mgr
</commit_message>
<xml_diff>
--- a/architecture/Architecture.pptx
+++ b/architecture/Architecture.pptx
@@ -259,7 +259,7 @@
           <a:p>
             <a:fld id="{B499FD6C-541F-EC48-A952-9DA60F00EB37}" type="datetimeFigureOut">
               <a:rPr lang="en-US" smtClean="0"/>
-              <a:t>12/1/18</a:t>
+              <a:t>12/2/18</a:t>
             </a:fld>
             <a:endParaRPr lang="en-US"/>
           </a:p>
@@ -457,7 +457,7 @@
           <a:p>
             <a:fld id="{B499FD6C-541F-EC48-A952-9DA60F00EB37}" type="datetimeFigureOut">
               <a:rPr lang="en-US" smtClean="0"/>
-              <a:t>12/1/18</a:t>
+              <a:t>12/2/18</a:t>
             </a:fld>
             <a:endParaRPr lang="en-US"/>
           </a:p>
@@ -665,7 +665,7 @@
           <a:p>
             <a:fld id="{B499FD6C-541F-EC48-A952-9DA60F00EB37}" type="datetimeFigureOut">
               <a:rPr lang="en-US" smtClean="0"/>
-              <a:t>12/1/18</a:t>
+              <a:t>12/2/18</a:t>
             </a:fld>
             <a:endParaRPr lang="en-US"/>
           </a:p>
@@ -863,7 +863,7 @@
           <a:p>
             <a:fld id="{B499FD6C-541F-EC48-A952-9DA60F00EB37}" type="datetimeFigureOut">
               <a:rPr lang="en-US" smtClean="0"/>
-              <a:t>12/1/18</a:t>
+              <a:t>12/2/18</a:t>
             </a:fld>
             <a:endParaRPr lang="en-US"/>
           </a:p>
@@ -1138,7 +1138,7 @@
           <a:p>
             <a:fld id="{B499FD6C-541F-EC48-A952-9DA60F00EB37}" type="datetimeFigureOut">
               <a:rPr lang="en-US" smtClean="0"/>
-              <a:t>12/1/18</a:t>
+              <a:t>12/2/18</a:t>
             </a:fld>
             <a:endParaRPr lang="en-US"/>
           </a:p>
@@ -1403,7 +1403,7 @@
           <a:p>
             <a:fld id="{B499FD6C-541F-EC48-A952-9DA60F00EB37}" type="datetimeFigureOut">
               <a:rPr lang="en-US" smtClean="0"/>
-              <a:t>12/1/18</a:t>
+              <a:t>12/2/18</a:t>
             </a:fld>
             <a:endParaRPr lang="en-US"/>
           </a:p>
@@ -1815,7 +1815,7 @@
           <a:p>
             <a:fld id="{B499FD6C-541F-EC48-A952-9DA60F00EB37}" type="datetimeFigureOut">
               <a:rPr lang="en-US" smtClean="0"/>
-              <a:t>12/1/18</a:t>
+              <a:t>12/2/18</a:t>
             </a:fld>
             <a:endParaRPr lang="en-US"/>
           </a:p>
@@ -1956,7 +1956,7 @@
           <a:p>
             <a:fld id="{B499FD6C-541F-EC48-A952-9DA60F00EB37}" type="datetimeFigureOut">
               <a:rPr lang="en-US" smtClean="0"/>
-              <a:t>12/1/18</a:t>
+              <a:t>12/2/18</a:t>
             </a:fld>
             <a:endParaRPr lang="en-US"/>
           </a:p>
@@ -2069,7 +2069,7 @@
           <a:p>
             <a:fld id="{B499FD6C-541F-EC48-A952-9DA60F00EB37}" type="datetimeFigureOut">
               <a:rPr lang="en-US" smtClean="0"/>
-              <a:t>12/1/18</a:t>
+              <a:t>12/2/18</a:t>
             </a:fld>
             <a:endParaRPr lang="en-US"/>
           </a:p>
@@ -2380,7 +2380,7 @@
           <a:p>
             <a:fld id="{B499FD6C-541F-EC48-A952-9DA60F00EB37}" type="datetimeFigureOut">
               <a:rPr lang="en-US" smtClean="0"/>
-              <a:t>12/1/18</a:t>
+              <a:t>12/2/18</a:t>
             </a:fld>
             <a:endParaRPr lang="en-US"/>
           </a:p>
@@ -2668,7 +2668,7 @@
           <a:p>
             <a:fld id="{B499FD6C-541F-EC48-A952-9DA60F00EB37}" type="datetimeFigureOut">
               <a:rPr lang="en-US" smtClean="0"/>
-              <a:t>12/1/18</a:t>
+              <a:t>12/2/18</a:t>
             </a:fld>
             <a:endParaRPr lang="en-US"/>
           </a:p>
@@ -2909,7 +2909,7 @@
           <a:p>
             <a:fld id="{B499FD6C-541F-EC48-A952-9DA60F00EB37}" type="datetimeFigureOut">
               <a:rPr lang="en-US" smtClean="0"/>
-              <a:t>12/1/18</a:t>
+              <a:t>12/2/18</a:t>
             </a:fld>
             <a:endParaRPr lang="en-US"/>
           </a:p>
@@ -3340,7 +3340,7 @@
         </p:nvSpPr>
         <p:spPr>
           <a:xfrm>
-            <a:off x="7757681" y="2389955"/>
+            <a:off x="4588547" y="2500006"/>
             <a:ext cx="2278505" cy="869430"/>
           </a:xfrm>
           <a:prstGeom prst="roundRect">
@@ -3370,61 +3370,17 @@
             <a:pPr algn="ctr"/>
             <a:r>
               <a:rPr lang="en-US" dirty="0"/>
-              <a:t>Portfolio DB (MySQL)</a:t>
-            </a:r>
-          </a:p>
-        </p:txBody>
-      </p:sp>
-      <p:cxnSp>
-        <p:nvCxnSpPr>
-          <p:cNvPr id="48" name="Elbow Connector 47">
-            <a:extLst>
-              <a:ext uri="{FF2B5EF4-FFF2-40B4-BE49-F238E27FC236}">
-                <a16:creationId xmlns:a16="http://schemas.microsoft.com/office/drawing/2014/main" id="{001899DF-CACE-C64D-95E4-3817BB977E9B}"/>
-              </a:ext>
-            </a:extLst>
-          </p:cNvPr>
-          <p:cNvCxnSpPr>
-            <a:cxnSpLocks/>
-            <a:endCxn id="12" idx="3"/>
-          </p:cNvCxnSpPr>
-          <p:nvPr/>
-        </p:nvCxnSpPr>
-        <p:spPr>
-          <a:xfrm rot="10800000" flipV="1">
-            <a:off x="10036186" y="2824668"/>
-            <a:ext cx="274326" cy="1"/>
-          </a:xfrm>
-          <a:prstGeom prst="bentConnector3">
-            <a:avLst>
-              <a:gd name="adj1" fmla="val 50000"/>
-            </a:avLst>
-          </a:prstGeom>
-          <a:ln>
-            <a:tailEnd type="triangle"/>
-          </a:ln>
-        </p:spPr>
-        <p:style>
-          <a:lnRef idx="1">
-            <a:schemeClr val="accent1"/>
-          </a:lnRef>
-          <a:fillRef idx="0">
-            <a:schemeClr val="accent1"/>
-          </a:fillRef>
-          <a:effectRef idx="0">
-            <a:schemeClr val="accent1"/>
-          </a:effectRef>
-          <a:fontRef idx="minor">
-            <a:schemeClr val="tx1"/>
-          </a:fontRef>
-        </p:style>
-      </p:cxnSp>
-      <p:sp>
-        <p:nvSpPr>
-          <p:cNvPr id="37" name="Rounded Rectangle 36">
-            <a:extLst>
-              <a:ext uri="{FF2B5EF4-FFF2-40B4-BE49-F238E27FC236}">
-                <a16:creationId xmlns:a16="http://schemas.microsoft.com/office/drawing/2014/main" id="{A25CC499-6D2B-CD4B-89CC-995E886B2CCB}"/>
+              <a:t>Redis</a:t>
+            </a:r>
+          </a:p>
+        </p:txBody>
+      </p:sp>
+      <p:sp>
+        <p:nvSpPr>
+          <p:cNvPr id="20" name="Rounded Rectangle 19">
+            <a:extLst>
+              <a:ext uri="{FF2B5EF4-FFF2-40B4-BE49-F238E27FC236}">
+                <a16:creationId xmlns:a16="http://schemas.microsoft.com/office/drawing/2014/main" id="{4FEF2B55-D724-524E-A442-D64AEBC5CED9}"/>
               </a:ext>
             </a:extLst>
           </p:cNvPr>
@@ -3433,15 +3389,12 @@
         </p:nvSpPr>
         <p:spPr>
           <a:xfrm>
-            <a:off x="9537437" y="4594042"/>
-            <a:ext cx="1678829" cy="869430"/>
+            <a:off x="5009011" y="4334051"/>
+            <a:ext cx="2403171" cy="869430"/>
           </a:xfrm>
           <a:prstGeom prst="roundRect">
             <a:avLst/>
           </a:prstGeom>
-          <a:solidFill>
-            <a:schemeClr val="accent2"/>
-          </a:solidFill>
         </p:spPr>
         <p:style>
           <a:lnRef idx="2">
@@ -3465,38 +3418,58 @@
           <a:p>
             <a:pPr algn="ctr"/>
             <a:r>
+              <a:rPr lang="en-US" dirty="0" err="1"/>
+              <a:t>Collatz</a:t>
+            </a:r>
+            <a:r>
               <a:rPr lang="en-US" dirty="0"/>
-              <a:t>Portfolio Table Create</a:t>
-            </a:r>
+              <a:t> </a:t>
+            </a:r>
+            <a:r>
+              <a:rPr lang="en-US" dirty="0" err="1"/>
+              <a:t>Mgr</a:t>
+            </a:r>
+            <a:endParaRPr lang="en-US" dirty="0"/>
           </a:p>
           <a:p>
             <a:pPr algn="ctr"/>
-            <a:endParaRPr lang="en-US" dirty="0"/>
+            <a:r>
+              <a:rPr lang="en-US" dirty="0"/>
+              <a:t>/</a:t>
+            </a:r>
+            <a:r>
+              <a:rPr lang="en-US" dirty="0" err="1"/>
+              <a:t>collatz-mgr</a:t>
+            </a:r>
+            <a:r>
+              <a:rPr lang="en-US" dirty="0"/>
+              <a:t>/size</a:t>
+            </a:r>
           </a:p>
         </p:txBody>
       </p:sp>
       <p:cxnSp>
         <p:nvCxnSpPr>
-          <p:cNvPr id="6" name="Elbow Connector 5">
-            <a:extLst>
-              <a:ext uri="{FF2B5EF4-FFF2-40B4-BE49-F238E27FC236}">
-                <a16:creationId xmlns:a16="http://schemas.microsoft.com/office/drawing/2014/main" id="{D86F4283-E2DD-8D45-BA0E-00CBD783CE12}"/>
+          <p:cNvPr id="21" name="Elbow Connector 20">
+            <a:extLst>
+              <a:ext uri="{FF2B5EF4-FFF2-40B4-BE49-F238E27FC236}">
+                <a16:creationId xmlns:a16="http://schemas.microsoft.com/office/drawing/2014/main" id="{A0D57CE8-D388-EE4F-94DA-55A3181E7D6D}"/>
               </a:ext>
             </a:extLst>
           </p:cNvPr>
           <p:cNvCxnSpPr>
             <a:cxnSpLocks/>
-            <a:stCxn id="37" idx="0"/>
-            <a:endCxn id="12" idx="3"/>
+            <a:stCxn id="20" idx="0"/>
+            <a:endCxn id="12" idx="2"/>
           </p:cNvCxnSpPr>
           <p:nvPr/>
         </p:nvCxnSpPr>
         <p:spPr>
           <a:xfrm rot="16200000" flipV="1">
-            <a:off x="9321833" y="3539023"/>
-            <a:ext cx="1769372" cy="340666"/>
+            <a:off x="5486892" y="3610345"/>
+            <a:ext cx="964615" cy="482797"/>
           </a:xfrm>
-          <a:prstGeom prst="bentConnector2">
+          <a:prstGeom prst="bentConnector3">
             <a:avLst/>
           </a:prstGeom>
           <a:ln>
@@ -3520,10 +3493,10 @@
       </p:cxnSp>
       <p:sp>
         <p:nvSpPr>
-          <p:cNvPr id="52" name="Rounded Rectangle 51">
-            <a:extLst>
-              <a:ext uri="{FF2B5EF4-FFF2-40B4-BE49-F238E27FC236}">
-                <a16:creationId xmlns:a16="http://schemas.microsoft.com/office/drawing/2014/main" id="{AD8066D5-1607-F645-B846-9693093F9E42}"/>
+          <p:cNvPr id="32" name="Rounded Rectangle 31">
+            <a:extLst>
+              <a:ext uri="{FF2B5EF4-FFF2-40B4-BE49-F238E27FC236}">
+                <a16:creationId xmlns:a16="http://schemas.microsoft.com/office/drawing/2014/main" id="{1C9CA0E7-8F4D-8249-97DA-057D485935D7}"/>
               </a:ext>
             </a:extLst>
           </p:cNvPr>
@@ -3532,7 +3505,7 @@
         </p:nvSpPr>
         <p:spPr>
           <a:xfrm>
-            <a:off x="3423911" y="681136"/>
+            <a:off x="1316399" y="2500006"/>
             <a:ext cx="1678829" cy="869430"/>
           </a:xfrm>
           <a:prstGeom prst="roundRect">
@@ -3564,9 +3537,10 @@
           <a:p>
             <a:pPr algn="ctr"/>
             <a:r>
-              <a:rPr lang="en-US" dirty="0"/>
-              <a:t>Parse CSV</a:t>
-            </a:r>
+              <a:rPr lang="en-US" dirty="0" err="1"/>
+              <a:t>Collatz</a:t>
+            </a:r>
+            <a:endParaRPr lang="en-US" dirty="0"/>
           </a:p>
           <a:p>
             <a:pPr algn="ctr"/>
@@ -3574,685 +3548,6 @@
           </a:p>
         </p:txBody>
       </p:sp>
-      <p:sp>
-        <p:nvSpPr>
-          <p:cNvPr id="54" name="Rounded Rectangle 53">
-            <a:extLst>
-              <a:ext uri="{FF2B5EF4-FFF2-40B4-BE49-F238E27FC236}">
-                <a16:creationId xmlns:a16="http://schemas.microsoft.com/office/drawing/2014/main" id="{B4ED213F-D78D-944C-843D-4C8BD275813F}"/>
-              </a:ext>
-            </a:extLst>
-          </p:cNvPr>
-          <p:cNvSpPr/>
-          <p:nvPr/>
-        </p:nvSpPr>
-        <p:spPr>
-          <a:xfrm>
-            <a:off x="305991" y="612585"/>
-            <a:ext cx="2278505" cy="869430"/>
-          </a:xfrm>
-          <a:prstGeom prst="roundRect">
-            <a:avLst/>
-          </a:prstGeom>
-          <a:solidFill>
-            <a:schemeClr val="accent6"/>
-          </a:solidFill>
-        </p:spPr>
-        <p:style>
-          <a:lnRef idx="2">
-            <a:schemeClr val="accent1">
-              <a:shade val="50000"/>
-            </a:schemeClr>
-          </a:lnRef>
-          <a:fillRef idx="1">
-            <a:schemeClr val="accent1"/>
-          </a:fillRef>
-          <a:effectRef idx="0">
-            <a:schemeClr val="accent1"/>
-          </a:effectRef>
-          <a:fontRef idx="minor">
-            <a:schemeClr val="lt1"/>
-          </a:fontRef>
-        </p:style>
-        <p:txBody>
-          <a:bodyPr rtlCol="0" anchor="ctr"/>
-          <a:lstStyle/>
-          <a:p>
-            <a:pPr algn="ctr"/>
-            <a:r>
-              <a:rPr lang="en-US" dirty="0"/>
-              <a:t>Portfolio CSV</a:t>
-            </a:r>
-          </a:p>
-        </p:txBody>
-      </p:sp>
-      <p:cxnSp>
-        <p:nvCxnSpPr>
-          <p:cNvPr id="31" name="Elbow Connector 30">
-            <a:extLst>
-              <a:ext uri="{FF2B5EF4-FFF2-40B4-BE49-F238E27FC236}">
-                <a16:creationId xmlns:a16="http://schemas.microsoft.com/office/drawing/2014/main" id="{E517E7E4-9097-C74A-AD58-115BC8961BE3}"/>
-              </a:ext>
-            </a:extLst>
-          </p:cNvPr>
-          <p:cNvCxnSpPr>
-            <a:cxnSpLocks/>
-            <a:stCxn id="54" idx="3"/>
-            <a:endCxn id="52" idx="1"/>
-          </p:cNvCxnSpPr>
-          <p:nvPr/>
-        </p:nvCxnSpPr>
-        <p:spPr>
-          <a:xfrm>
-            <a:off x="2584496" y="1047300"/>
-            <a:ext cx="839415" cy="68551"/>
-          </a:xfrm>
-          <a:prstGeom prst="bentConnector3">
-            <a:avLst>
-              <a:gd name="adj1" fmla="val 50000"/>
-            </a:avLst>
-          </a:prstGeom>
-          <a:ln>
-            <a:tailEnd type="triangle"/>
-          </a:ln>
-        </p:spPr>
-        <p:style>
-          <a:lnRef idx="1">
-            <a:schemeClr val="accent1"/>
-          </a:lnRef>
-          <a:fillRef idx="0">
-            <a:schemeClr val="accent1"/>
-          </a:fillRef>
-          <a:effectRef idx="0">
-            <a:schemeClr val="accent1"/>
-          </a:effectRef>
-          <a:fontRef idx="minor">
-            <a:schemeClr val="tx1"/>
-          </a:fontRef>
-        </p:style>
-      </p:cxnSp>
-      <p:cxnSp>
-        <p:nvCxnSpPr>
-          <p:cNvPr id="38" name="Elbow Connector 37">
-            <a:extLst>
-              <a:ext uri="{FF2B5EF4-FFF2-40B4-BE49-F238E27FC236}">
-                <a16:creationId xmlns:a16="http://schemas.microsoft.com/office/drawing/2014/main" id="{AB8B54AF-C6E6-7841-91B7-0988EA57C801}"/>
-              </a:ext>
-            </a:extLst>
-          </p:cNvPr>
-          <p:cNvCxnSpPr>
-            <a:cxnSpLocks/>
-            <a:stCxn id="52" idx="3"/>
-            <a:endCxn id="13" idx="1"/>
-          </p:cNvCxnSpPr>
-          <p:nvPr/>
-        </p:nvCxnSpPr>
-        <p:spPr>
-          <a:xfrm flipV="1">
-            <a:off x="5102740" y="1085811"/>
-            <a:ext cx="2922052" cy="30040"/>
-          </a:xfrm>
-          <a:prstGeom prst="bentConnector3">
-            <a:avLst/>
-          </a:prstGeom>
-          <a:ln>
-            <a:tailEnd type="triangle"/>
-          </a:ln>
-        </p:spPr>
-        <p:style>
-          <a:lnRef idx="1">
-            <a:schemeClr val="accent1"/>
-          </a:lnRef>
-          <a:fillRef idx="0">
-            <a:schemeClr val="accent1"/>
-          </a:fillRef>
-          <a:effectRef idx="0">
-            <a:schemeClr val="accent1"/>
-          </a:effectRef>
-          <a:fontRef idx="minor">
-            <a:schemeClr val="tx1"/>
-          </a:fontRef>
-        </p:style>
-      </p:cxnSp>
-      <p:sp>
-        <p:nvSpPr>
-          <p:cNvPr id="13" name="Rounded Rectangle 12">
-            <a:extLst>
-              <a:ext uri="{FF2B5EF4-FFF2-40B4-BE49-F238E27FC236}">
-                <a16:creationId xmlns:a16="http://schemas.microsoft.com/office/drawing/2014/main" id="{F69ED8FE-2828-EC41-AEBA-60830E886B9F}"/>
-              </a:ext>
-            </a:extLst>
-          </p:cNvPr>
-          <p:cNvSpPr/>
-          <p:nvPr/>
-        </p:nvSpPr>
-        <p:spPr>
-          <a:xfrm>
-            <a:off x="8024792" y="651096"/>
-            <a:ext cx="1678829" cy="869430"/>
-          </a:xfrm>
-          <a:prstGeom prst="roundRect">
-            <a:avLst/>
-          </a:prstGeom>
-          <a:solidFill>
-            <a:schemeClr val="accent1"/>
-          </a:solidFill>
-        </p:spPr>
-        <p:style>
-          <a:lnRef idx="2">
-            <a:schemeClr val="accent1">
-              <a:shade val="50000"/>
-            </a:schemeClr>
-          </a:lnRef>
-          <a:fillRef idx="1">
-            <a:schemeClr val="accent1"/>
-          </a:fillRef>
-          <a:effectRef idx="0">
-            <a:schemeClr val="accent1"/>
-          </a:effectRef>
-          <a:fontRef idx="minor">
-            <a:schemeClr val="lt1"/>
-          </a:fontRef>
-        </p:style>
-        <p:txBody>
-          <a:bodyPr rtlCol="0" anchor="ctr"/>
-          <a:lstStyle/>
-          <a:p>
-            <a:pPr algn="ctr"/>
-            <a:r>
-              <a:rPr lang="en-US" dirty="0"/>
-              <a:t>Portfolio Table Set</a:t>
-            </a:r>
-          </a:p>
-          <a:p>
-            <a:pPr algn="ctr"/>
-            <a:endParaRPr lang="en-US" dirty="0"/>
-          </a:p>
-        </p:txBody>
-      </p:sp>
-      <p:cxnSp>
-        <p:nvCxnSpPr>
-          <p:cNvPr id="8" name="Elbow Connector 7">
-            <a:extLst>
-              <a:ext uri="{FF2B5EF4-FFF2-40B4-BE49-F238E27FC236}">
-                <a16:creationId xmlns:a16="http://schemas.microsoft.com/office/drawing/2014/main" id="{9065EA04-BCEE-044A-AD8C-22515191DD4C}"/>
-              </a:ext>
-            </a:extLst>
-          </p:cNvPr>
-          <p:cNvCxnSpPr>
-            <a:stCxn id="13" idx="2"/>
-            <a:endCxn id="12" idx="0"/>
-          </p:cNvCxnSpPr>
-          <p:nvPr/>
-        </p:nvCxnSpPr>
-        <p:spPr>
-          <a:xfrm rot="16200000" flipH="1">
-            <a:off x="8445856" y="1938876"/>
-            <a:ext cx="869429" cy="32727"/>
-          </a:xfrm>
-          <a:prstGeom prst="bentConnector3">
-            <a:avLst/>
-          </a:prstGeom>
-          <a:ln>
-            <a:tailEnd type="triangle"/>
-          </a:ln>
-        </p:spPr>
-        <p:style>
-          <a:lnRef idx="1">
-            <a:schemeClr val="accent1"/>
-          </a:lnRef>
-          <a:fillRef idx="0">
-            <a:schemeClr val="accent1"/>
-          </a:fillRef>
-          <a:effectRef idx="0">
-            <a:schemeClr val="accent1"/>
-          </a:effectRef>
-          <a:fontRef idx="minor">
-            <a:schemeClr val="tx1"/>
-          </a:fontRef>
-        </p:style>
-      </p:cxnSp>
-      <p:sp>
-        <p:nvSpPr>
-          <p:cNvPr id="20" name="Rounded Rectangle 19">
-            <a:extLst>
-              <a:ext uri="{FF2B5EF4-FFF2-40B4-BE49-F238E27FC236}">
-                <a16:creationId xmlns:a16="http://schemas.microsoft.com/office/drawing/2014/main" id="{4FEF2B55-D724-524E-A442-D64AEBC5CED9}"/>
-              </a:ext>
-            </a:extLst>
-          </p:cNvPr>
-          <p:cNvSpPr/>
-          <p:nvPr/>
-        </p:nvSpPr>
-        <p:spPr>
-          <a:xfrm>
-            <a:off x="7209983" y="4500306"/>
-            <a:ext cx="1437575" cy="869430"/>
-          </a:xfrm>
-          <a:prstGeom prst="roundRect">
-            <a:avLst/>
-          </a:prstGeom>
-        </p:spPr>
-        <p:style>
-          <a:lnRef idx="2">
-            <a:schemeClr val="accent1">
-              <a:shade val="50000"/>
-            </a:schemeClr>
-          </a:lnRef>
-          <a:fillRef idx="1">
-            <a:schemeClr val="accent1"/>
-          </a:fillRef>
-          <a:effectRef idx="0">
-            <a:schemeClr val="accent1"/>
-          </a:effectRef>
-          <a:fontRef idx="minor">
-            <a:schemeClr val="lt1"/>
-          </a:fontRef>
-        </p:style>
-        <p:txBody>
-          <a:bodyPr rtlCol="0" anchor="ctr"/>
-          <a:lstStyle/>
-          <a:p>
-            <a:pPr algn="ctr"/>
-            <a:r>
-              <a:rPr lang="en-US" dirty="0"/>
-              <a:t>Portfolio Table List</a:t>
-            </a:r>
-          </a:p>
-          <a:p>
-            <a:pPr algn="ctr"/>
-            <a:r>
-              <a:rPr lang="en-US" dirty="0"/>
-              <a:t>/list</a:t>
-            </a:r>
-          </a:p>
-        </p:txBody>
-      </p:sp>
-      <p:cxnSp>
-        <p:nvCxnSpPr>
-          <p:cNvPr id="21" name="Elbow Connector 20">
-            <a:extLst>
-              <a:ext uri="{FF2B5EF4-FFF2-40B4-BE49-F238E27FC236}">
-                <a16:creationId xmlns:a16="http://schemas.microsoft.com/office/drawing/2014/main" id="{A0D57CE8-D388-EE4F-94DA-55A3181E7D6D}"/>
-              </a:ext>
-            </a:extLst>
-          </p:cNvPr>
-          <p:cNvCxnSpPr>
-            <a:cxnSpLocks/>
-            <a:stCxn id="20" idx="0"/>
-            <a:endCxn id="12" idx="2"/>
-          </p:cNvCxnSpPr>
-          <p:nvPr/>
-        </p:nvCxnSpPr>
-        <p:spPr>
-          <a:xfrm rot="5400000" flipH="1" flipV="1">
-            <a:off x="7792392" y="3395765"/>
-            <a:ext cx="1240921" cy="968163"/>
-          </a:xfrm>
-          <a:prstGeom prst="bentConnector3">
-            <a:avLst/>
-          </a:prstGeom>
-          <a:ln>
-            <a:tailEnd type="triangle"/>
-          </a:ln>
-        </p:spPr>
-        <p:style>
-          <a:lnRef idx="1">
-            <a:schemeClr val="accent1"/>
-          </a:lnRef>
-          <a:fillRef idx="0">
-            <a:schemeClr val="accent1"/>
-          </a:fillRef>
-          <a:effectRef idx="0">
-            <a:schemeClr val="accent1"/>
-          </a:effectRef>
-          <a:fontRef idx="minor">
-            <a:schemeClr val="tx1"/>
-          </a:fontRef>
-        </p:style>
-      </p:cxnSp>
-      <p:sp>
-        <p:nvSpPr>
-          <p:cNvPr id="17" name="Rounded Rectangle 16">
-            <a:extLst>
-              <a:ext uri="{FF2B5EF4-FFF2-40B4-BE49-F238E27FC236}">
-                <a16:creationId xmlns:a16="http://schemas.microsoft.com/office/drawing/2014/main" id="{4D15BD4F-E9F2-374E-B51D-420F61C0754B}"/>
-              </a:ext>
-            </a:extLst>
-          </p:cNvPr>
-          <p:cNvSpPr/>
-          <p:nvPr/>
-        </p:nvSpPr>
-        <p:spPr>
-          <a:xfrm>
-            <a:off x="220045" y="4124645"/>
-            <a:ext cx="2278505" cy="869430"/>
-          </a:xfrm>
-          <a:prstGeom prst="roundRect">
-            <a:avLst/>
-          </a:prstGeom>
-          <a:solidFill>
-            <a:schemeClr val="accent6"/>
-          </a:solidFill>
-        </p:spPr>
-        <p:style>
-          <a:lnRef idx="2">
-            <a:schemeClr val="accent1">
-              <a:shade val="50000"/>
-            </a:schemeClr>
-          </a:lnRef>
-          <a:fillRef idx="1">
-            <a:schemeClr val="accent1"/>
-          </a:fillRef>
-          <a:effectRef idx="0">
-            <a:schemeClr val="accent1"/>
-          </a:effectRef>
-          <a:fontRef idx="minor">
-            <a:schemeClr val="lt1"/>
-          </a:fontRef>
-        </p:style>
-        <p:txBody>
-          <a:bodyPr rtlCol="0" anchor="ctr"/>
-          <a:lstStyle/>
-          <a:p>
-            <a:pPr algn="ctr"/>
-            <a:r>
-              <a:rPr lang="en-US" dirty="0"/>
-              <a:t>ETFDB</a:t>
-            </a:r>
-          </a:p>
-        </p:txBody>
-      </p:sp>
-      <p:sp>
-        <p:nvSpPr>
-          <p:cNvPr id="18" name="Rounded Rectangle 17">
-            <a:extLst>
-              <a:ext uri="{FF2B5EF4-FFF2-40B4-BE49-F238E27FC236}">
-                <a16:creationId xmlns:a16="http://schemas.microsoft.com/office/drawing/2014/main" id="{C1121287-712E-C241-B620-C9C0EA795E65}"/>
-              </a:ext>
-            </a:extLst>
-          </p:cNvPr>
-          <p:cNvSpPr/>
-          <p:nvPr/>
-        </p:nvSpPr>
-        <p:spPr>
-          <a:xfrm>
-            <a:off x="640395" y="2581451"/>
-            <a:ext cx="1678829" cy="869430"/>
-          </a:xfrm>
-          <a:prstGeom prst="roundRect">
-            <a:avLst/>
-          </a:prstGeom>
-          <a:solidFill>
-            <a:schemeClr val="accent1"/>
-          </a:solidFill>
-        </p:spPr>
-        <p:style>
-          <a:lnRef idx="2">
-            <a:schemeClr val="accent1">
-              <a:shade val="50000"/>
-            </a:schemeClr>
-          </a:lnRef>
-          <a:fillRef idx="1">
-            <a:schemeClr val="accent1"/>
-          </a:fillRef>
-          <a:effectRef idx="0">
-            <a:schemeClr val="accent1"/>
-          </a:effectRef>
-          <a:fontRef idx="minor">
-            <a:schemeClr val="lt1"/>
-          </a:fontRef>
-        </p:style>
-        <p:txBody>
-          <a:bodyPr rtlCol="0" anchor="ctr"/>
-          <a:lstStyle/>
-          <a:p>
-            <a:pPr algn="ctr"/>
-            <a:r>
-              <a:rPr lang="en-US" dirty="0"/>
-              <a:t>All ETFS</a:t>
-            </a:r>
-          </a:p>
-          <a:p>
-            <a:pPr algn="ctr"/>
-            <a:endParaRPr lang="en-US" dirty="0"/>
-          </a:p>
-        </p:txBody>
-      </p:sp>
-      <p:sp>
-        <p:nvSpPr>
-          <p:cNvPr id="33" name="Rounded Rectangle 32">
-            <a:extLst>
-              <a:ext uri="{FF2B5EF4-FFF2-40B4-BE49-F238E27FC236}">
-                <a16:creationId xmlns:a16="http://schemas.microsoft.com/office/drawing/2014/main" id="{724EFB77-E4FB-024C-9EC3-F444B79D43A4}"/>
-              </a:ext>
-            </a:extLst>
-          </p:cNvPr>
-          <p:cNvSpPr/>
-          <p:nvPr/>
-        </p:nvSpPr>
-        <p:spPr>
-          <a:xfrm>
-            <a:off x="3038012" y="2424386"/>
-            <a:ext cx="2278505" cy="869430"/>
-          </a:xfrm>
-          <a:prstGeom prst="roundRect">
-            <a:avLst/>
-          </a:prstGeom>
-        </p:spPr>
-        <p:style>
-          <a:lnRef idx="2">
-            <a:schemeClr val="accent1">
-              <a:shade val="50000"/>
-            </a:schemeClr>
-          </a:lnRef>
-          <a:fillRef idx="1">
-            <a:schemeClr val="accent1"/>
-          </a:fillRef>
-          <a:effectRef idx="0">
-            <a:schemeClr val="accent1"/>
-          </a:effectRef>
-          <a:fontRef idx="minor">
-            <a:schemeClr val="lt1"/>
-          </a:fontRef>
-        </p:style>
-        <p:txBody>
-          <a:bodyPr rtlCol="0" anchor="ctr"/>
-          <a:lstStyle/>
-          <a:p>
-            <a:pPr algn="ctr"/>
-            <a:r>
-              <a:rPr lang="en-US" dirty="0"/>
-              <a:t>RabbitMQ</a:t>
-            </a:r>
-          </a:p>
-          <a:p>
-            <a:pPr algn="ctr"/>
-            <a:endParaRPr lang="en-US" dirty="0"/>
-          </a:p>
-        </p:txBody>
-      </p:sp>
-      <p:cxnSp>
-        <p:nvCxnSpPr>
-          <p:cNvPr id="28" name="Elbow Connector 27">
-            <a:extLst>
-              <a:ext uri="{FF2B5EF4-FFF2-40B4-BE49-F238E27FC236}">
-                <a16:creationId xmlns:a16="http://schemas.microsoft.com/office/drawing/2014/main" id="{EE5451F9-E2E1-B248-90A3-830094EC5799}"/>
-              </a:ext>
-            </a:extLst>
-          </p:cNvPr>
-          <p:cNvCxnSpPr>
-            <a:endCxn id="18" idx="2"/>
-          </p:cNvCxnSpPr>
-          <p:nvPr/>
-        </p:nvCxnSpPr>
-        <p:spPr>
-          <a:xfrm rot="5400000" flipH="1" flipV="1">
-            <a:off x="1142927" y="3787763"/>
-            <a:ext cx="673764" cy="1"/>
-          </a:xfrm>
-          <a:prstGeom prst="bentConnector3">
-            <a:avLst/>
-          </a:prstGeom>
-          <a:ln>
-            <a:tailEnd type="triangle"/>
-          </a:ln>
-        </p:spPr>
-        <p:style>
-          <a:lnRef idx="1">
-            <a:schemeClr val="accent1"/>
-          </a:lnRef>
-          <a:fillRef idx="0">
-            <a:schemeClr val="accent1"/>
-          </a:fillRef>
-          <a:effectRef idx="0">
-            <a:schemeClr val="accent1"/>
-          </a:effectRef>
-          <a:fontRef idx="minor">
-            <a:schemeClr val="tx1"/>
-          </a:fontRef>
-        </p:style>
-      </p:cxnSp>
-      <p:cxnSp>
-        <p:nvCxnSpPr>
-          <p:cNvPr id="30" name="Elbow Connector 29">
-            <a:extLst>
-              <a:ext uri="{FF2B5EF4-FFF2-40B4-BE49-F238E27FC236}">
-                <a16:creationId xmlns:a16="http://schemas.microsoft.com/office/drawing/2014/main" id="{925845EB-DC54-C94E-AA1F-83EC9883EC0A}"/>
-              </a:ext>
-            </a:extLst>
-          </p:cNvPr>
-          <p:cNvCxnSpPr>
-            <a:stCxn id="18" idx="3"/>
-            <a:endCxn id="33" idx="1"/>
-          </p:cNvCxnSpPr>
-          <p:nvPr/>
-        </p:nvCxnSpPr>
-        <p:spPr>
-          <a:xfrm flipV="1">
-            <a:off x="2319224" y="2859101"/>
-            <a:ext cx="718788" cy="157065"/>
-          </a:xfrm>
-          <a:prstGeom prst="bentConnector3">
-            <a:avLst/>
-          </a:prstGeom>
-          <a:ln>
-            <a:tailEnd type="triangle"/>
-          </a:ln>
-        </p:spPr>
-        <p:style>
-          <a:lnRef idx="1">
-            <a:schemeClr val="accent1"/>
-          </a:lnRef>
-          <a:fillRef idx="0">
-            <a:schemeClr val="accent1"/>
-          </a:fillRef>
-          <a:effectRef idx="0">
-            <a:schemeClr val="accent1"/>
-          </a:effectRef>
-          <a:fontRef idx="minor">
-            <a:schemeClr val="tx1"/>
-          </a:fontRef>
-        </p:style>
-      </p:cxnSp>
-      <p:sp>
-        <p:nvSpPr>
-          <p:cNvPr id="32" name="Rounded Rectangle 31">
-            <a:extLst>
-              <a:ext uri="{FF2B5EF4-FFF2-40B4-BE49-F238E27FC236}">
-                <a16:creationId xmlns:a16="http://schemas.microsoft.com/office/drawing/2014/main" id="{1C9CA0E7-8F4D-8249-97DA-057D485935D7}"/>
-              </a:ext>
-            </a:extLst>
-          </p:cNvPr>
-          <p:cNvSpPr/>
-          <p:nvPr/>
-        </p:nvSpPr>
-        <p:spPr>
-          <a:xfrm>
-            <a:off x="5650266" y="2406545"/>
-            <a:ext cx="1678829" cy="869430"/>
-          </a:xfrm>
-          <a:prstGeom prst="roundRect">
-            <a:avLst/>
-          </a:prstGeom>
-          <a:solidFill>
-            <a:schemeClr val="accent1"/>
-          </a:solidFill>
-        </p:spPr>
-        <p:style>
-          <a:lnRef idx="2">
-            <a:schemeClr val="accent1">
-              <a:shade val="50000"/>
-            </a:schemeClr>
-          </a:lnRef>
-          <a:fillRef idx="1">
-            <a:schemeClr val="accent1"/>
-          </a:fillRef>
-          <a:effectRef idx="0">
-            <a:schemeClr val="accent1"/>
-          </a:effectRef>
-          <a:fontRef idx="minor">
-            <a:schemeClr val="lt1"/>
-          </a:fontRef>
-        </p:style>
-        <p:txBody>
-          <a:bodyPr rtlCol="0" anchor="ctr"/>
-          <a:lstStyle/>
-          <a:p>
-            <a:pPr algn="ctr"/>
-            <a:r>
-              <a:rPr lang="en-US" dirty="0"/>
-              <a:t>Process ETFs</a:t>
-            </a:r>
-          </a:p>
-          <a:p>
-            <a:pPr algn="ctr"/>
-            <a:endParaRPr lang="en-US" dirty="0"/>
-          </a:p>
-        </p:txBody>
-      </p:sp>
-      <p:cxnSp>
-        <p:nvCxnSpPr>
-          <p:cNvPr id="24" name="Elbow Connector 23">
-            <a:extLst>
-              <a:ext uri="{FF2B5EF4-FFF2-40B4-BE49-F238E27FC236}">
-                <a16:creationId xmlns:a16="http://schemas.microsoft.com/office/drawing/2014/main" id="{D5E08611-BAC9-824F-9FFD-11B2B15BACBC}"/>
-              </a:ext>
-            </a:extLst>
-          </p:cNvPr>
-          <p:cNvCxnSpPr>
-            <a:stCxn id="33" idx="3"/>
-            <a:endCxn id="32" idx="1"/>
-          </p:cNvCxnSpPr>
-          <p:nvPr/>
-        </p:nvCxnSpPr>
-        <p:spPr>
-          <a:xfrm flipV="1">
-            <a:off x="5316517" y="2841260"/>
-            <a:ext cx="333749" cy="17841"/>
-          </a:xfrm>
-          <a:prstGeom prst="bentConnector3">
-            <a:avLst/>
-          </a:prstGeom>
-          <a:ln>
-            <a:tailEnd type="triangle"/>
-          </a:ln>
-        </p:spPr>
-        <p:style>
-          <a:lnRef idx="1">
-            <a:schemeClr val="accent1"/>
-          </a:lnRef>
-          <a:fillRef idx="0">
-            <a:schemeClr val="accent1"/>
-          </a:fillRef>
-          <a:effectRef idx="0">
-            <a:schemeClr val="accent1"/>
-          </a:effectRef>
-          <a:fontRef idx="minor">
-            <a:schemeClr val="tx1"/>
-          </a:fontRef>
-        </p:style>
-      </p:cxnSp>
       <p:cxnSp>
         <p:nvCxnSpPr>
           <p:cNvPr id="26" name="Elbow Connector 25">
@@ -4269,9 +3564,9 @@
           <p:nvPr/>
         </p:nvCxnSpPr>
         <p:spPr>
-          <a:xfrm flipV="1">
-            <a:off x="7329095" y="2824670"/>
-            <a:ext cx="428586" cy="16590"/>
+          <a:xfrm>
+            <a:off x="2995228" y="2934721"/>
+            <a:ext cx="1593319" cy="12700"/>
           </a:xfrm>
           <a:prstGeom prst="bentConnector3">
             <a:avLst/>

</xml_diff>